<commit_message>
Aggiunte slide di presentazione
</commit_message>
<xml_diff>
--- a/Slides/presentazione frigo.pptx
+++ b/Slides/presentazione frigo.pptx
@@ -110,6 +110,22 @@
       </a:defRPr>
     </a:lvl9pPr>
   </p:defaultTextStyle>
+  <p:extLst>
+    <p:ext uri="{EFAFB233-063F-42B5-8137-9DF3F51BA10A}">
+      <p15:sldGuideLst xmlns:p15="http://schemas.microsoft.com/office/powerpoint/2012/main">
+        <p15:guide id="1" orient="horz" pos="2160">
+          <p15:clr>
+            <a:srgbClr val="A4A3A4"/>
+          </p15:clr>
+        </p15:guide>
+        <p15:guide id="2" pos="2880">
+          <p15:clr>
+            <a:srgbClr val="A4A3A4"/>
+          </p15:clr>
+        </p15:guide>
+      </p15:sldGuideLst>
+    </p:ext>
+  </p:extLst>
 </p:presentation>
 </file>
 
@@ -193,9 +209,7 @@
         </p:style>
         <p:txBody>
           <a:bodyPr anchor="ctr"/>
-          <a:lstStyle>
-            <a:extLst/>
-          </a:lstStyle>
+          <a:lstStyle/>
           <a:p>
             <a:pPr algn="ctr" eaLnBrk="1" latinLnBrk="0" hangingPunct="1"/>
             <a:endParaRPr kumimoji="0" lang="en-US"/>
@@ -248,7 +262,7 @@
           </a:lstStyle>
           <a:p>
             <a:r>
-              <a:rPr kumimoji="0" lang="it-IT" smtClean="0"/>
+              <a:rPr kumimoji="0" lang="it-IT"/>
               <a:t>Fare clic per modificare lo stile del titolo</a:t>
             </a:r>
             <a:endParaRPr kumimoji="0" lang="en-US"/>
@@ -310,7 +324,7 @@
           </a:lstStyle>
           <a:p>
             <a:r>
-              <a:rPr kumimoji="0" lang="it-IT" smtClean="0"/>
+              <a:rPr kumimoji="0" lang="it-IT"/>
               <a:t>Fare clic per modificare lo stile del sottotitolo dello schema</a:t>
             </a:r>
             <a:endParaRPr kumimoji="0" lang="en-US"/>
@@ -408,9 +422,7 @@
           </p:spPr>
           <p:txBody>
             <a:bodyPr vert="horz" wrap="square" lIns="91440" tIns="45720" rIns="91440" bIns="45720" anchor="t" compatLnSpc="1"/>
-            <a:lstStyle>
-              <a:extLst/>
-            </a:lstStyle>
+            <a:lstStyle/>
             <a:p>
               <a:endParaRPr kumimoji="0" lang="en-US"/>
             </a:p>
@@ -490,9 +502,7 @@
           </p:spPr>
           <p:txBody>
             <a:bodyPr vert="horz" wrap="square" lIns="91440" tIns="45720" rIns="91440" bIns="45720" anchor="t" compatLnSpc="1"/>
-            <a:lstStyle>
-              <a:extLst/>
-            </a:lstStyle>
+            <a:lstStyle/>
             <a:p>
               <a:endParaRPr kumimoji="0" lang="en-US"/>
             </a:p>
@@ -649,9 +659,7 @@
           </p:style>
           <p:txBody>
             <a:bodyPr vert="horz" wrap="square" lIns="91440" tIns="45720" rIns="91440" bIns="45720" anchor="ctr" compatLnSpc="1"/>
-            <a:lstStyle>
-              <a:extLst/>
-            </a:lstStyle>
+            <a:lstStyle/>
             <a:p>
               <a:pPr algn="ctr" eaLnBrk="1" latinLnBrk="0" hangingPunct="1"/>
               <a:endParaRPr kumimoji="0" lang="en-US"/>
@@ -844,12 +852,10 @@
         <p:spPr/>
         <p:txBody>
           <a:bodyPr/>
-          <a:lstStyle>
-            <a:extLst/>
-          </a:lstStyle>
+          <a:lstStyle/>
           <a:p>
             <a:r>
-              <a:rPr kumimoji="0" lang="it-IT" smtClean="0"/>
+              <a:rPr kumimoji="0" lang="it-IT"/>
               <a:t>Fare clic per modificare lo stile del titolo</a:t>
             </a:r>
             <a:endParaRPr kumimoji="0" lang="en-US"/>
@@ -874,41 +880,39 @@
         </p:spPr>
         <p:txBody>
           <a:bodyPr vert="eaVert"/>
-          <a:lstStyle>
-            <a:extLst/>
-          </a:lstStyle>
+          <a:lstStyle/>
           <a:p>
             <a:pPr lvl="0" eaLnBrk="1" latinLnBrk="0" hangingPunct="1"/>
             <a:r>
-              <a:rPr lang="it-IT" smtClean="0"/>
+              <a:rPr lang="it-IT"/>
               <a:t>Fare clic per modificare stili del testo dello schema</a:t>
             </a:r>
           </a:p>
           <a:p>
             <a:pPr lvl="1" eaLnBrk="1" latinLnBrk="0" hangingPunct="1"/>
             <a:r>
-              <a:rPr lang="it-IT" smtClean="0"/>
+              <a:rPr lang="it-IT"/>
               <a:t>Secondo livello</a:t>
             </a:r>
           </a:p>
           <a:p>
             <a:pPr lvl="2" eaLnBrk="1" latinLnBrk="0" hangingPunct="1"/>
             <a:r>
-              <a:rPr lang="it-IT" smtClean="0"/>
+              <a:rPr lang="it-IT"/>
               <a:t>Terzo livello</a:t>
             </a:r>
           </a:p>
           <a:p>
             <a:pPr lvl="3" eaLnBrk="1" latinLnBrk="0" hangingPunct="1"/>
             <a:r>
-              <a:rPr lang="it-IT" smtClean="0"/>
+              <a:rPr lang="it-IT"/>
               <a:t>Quarto livello</a:t>
             </a:r>
           </a:p>
           <a:p>
             <a:pPr lvl="4" eaLnBrk="1" latinLnBrk="0" hangingPunct="1"/>
             <a:r>
-              <a:rPr lang="it-IT" smtClean="0"/>
+              <a:rPr lang="it-IT"/>
               <a:t>Quinto livello</a:t>
             </a:r>
             <a:endParaRPr kumimoji="0" lang="en-US"/>
@@ -928,9 +932,7 @@
         <p:spPr/>
         <p:txBody>
           <a:bodyPr/>
-          <a:lstStyle>
-            <a:extLst/>
-          </a:lstStyle>
+          <a:lstStyle/>
           <a:p>
             <a:fld id="{85911CFA-FE05-4CEE-ABBD-2C802EF4F6BC}" type="datetimeFigureOut">
               <a:rPr lang="it-IT" smtClean="0"/>
@@ -953,9 +955,7 @@
         <p:spPr/>
         <p:txBody>
           <a:bodyPr/>
-          <a:lstStyle>
-            <a:extLst/>
-          </a:lstStyle>
+          <a:lstStyle/>
           <a:p>
             <a:endParaRPr lang="it-IT"/>
           </a:p>
@@ -974,9 +974,7 @@
         <p:spPr/>
         <p:txBody>
           <a:bodyPr/>
-          <a:lstStyle>
-            <a:extLst/>
-          </a:lstStyle>
+          <a:lstStyle/>
           <a:p>
             <a:fld id="{A8037E01-E68B-4FCB-B645-70B9FE392D0B}" type="slidenum">
               <a:rPr lang="it-IT" smtClean="0"/>
@@ -1029,12 +1027,10 @@
         </p:spPr>
         <p:txBody>
           <a:bodyPr vert="eaVert"/>
-          <a:lstStyle>
-            <a:extLst/>
-          </a:lstStyle>
+          <a:lstStyle/>
           <a:p>
             <a:r>
-              <a:rPr kumimoji="0" lang="it-IT" smtClean="0"/>
+              <a:rPr kumimoji="0" lang="it-IT"/>
               <a:t>Fare clic per modificare lo stile del titolo</a:t>
             </a:r>
             <a:endParaRPr kumimoji="0" lang="en-US"/>
@@ -1059,41 +1055,39 @@
         </p:spPr>
         <p:txBody>
           <a:bodyPr vert="eaVert"/>
-          <a:lstStyle>
-            <a:extLst/>
-          </a:lstStyle>
+          <a:lstStyle/>
           <a:p>
             <a:pPr lvl="0" eaLnBrk="1" latinLnBrk="0" hangingPunct="1"/>
             <a:r>
-              <a:rPr lang="it-IT" smtClean="0"/>
+              <a:rPr lang="it-IT"/>
               <a:t>Fare clic per modificare stili del testo dello schema</a:t>
             </a:r>
           </a:p>
           <a:p>
             <a:pPr lvl="1" eaLnBrk="1" latinLnBrk="0" hangingPunct="1"/>
             <a:r>
-              <a:rPr lang="it-IT" smtClean="0"/>
+              <a:rPr lang="it-IT"/>
               <a:t>Secondo livello</a:t>
             </a:r>
           </a:p>
           <a:p>
             <a:pPr lvl="2" eaLnBrk="1" latinLnBrk="0" hangingPunct="1"/>
             <a:r>
-              <a:rPr lang="it-IT" smtClean="0"/>
+              <a:rPr lang="it-IT"/>
               <a:t>Terzo livello</a:t>
             </a:r>
           </a:p>
           <a:p>
             <a:pPr lvl="3" eaLnBrk="1" latinLnBrk="0" hangingPunct="1"/>
             <a:r>
-              <a:rPr lang="it-IT" smtClean="0"/>
+              <a:rPr lang="it-IT"/>
               <a:t>Quarto livello</a:t>
             </a:r>
           </a:p>
           <a:p>
             <a:pPr lvl="4" eaLnBrk="1" latinLnBrk="0" hangingPunct="1"/>
             <a:r>
-              <a:rPr lang="it-IT" smtClean="0"/>
+              <a:rPr lang="it-IT"/>
               <a:t>Quinto livello</a:t>
             </a:r>
             <a:endParaRPr kumimoji="0" lang="en-US"/>
@@ -1113,9 +1107,7 @@
         <p:spPr/>
         <p:txBody>
           <a:bodyPr/>
-          <a:lstStyle>
-            <a:extLst/>
-          </a:lstStyle>
+          <a:lstStyle/>
           <a:p>
             <a:fld id="{85911CFA-FE05-4CEE-ABBD-2C802EF4F6BC}" type="datetimeFigureOut">
               <a:rPr lang="it-IT" smtClean="0"/>
@@ -1138,9 +1130,7 @@
         <p:spPr/>
         <p:txBody>
           <a:bodyPr/>
-          <a:lstStyle>
-            <a:extLst/>
-          </a:lstStyle>
+          <a:lstStyle/>
           <a:p>
             <a:endParaRPr lang="it-IT"/>
           </a:p>
@@ -1159,9 +1149,7 @@
         <p:spPr/>
         <p:txBody>
           <a:bodyPr/>
-          <a:lstStyle>
-            <a:extLst/>
-          </a:lstStyle>
+          <a:lstStyle/>
           <a:p>
             <a:fld id="{A8037E01-E68B-4FCB-B645-70B9FE392D0B}" type="slidenum">
               <a:rPr lang="it-IT" smtClean="0"/>
@@ -1209,41 +1197,39 @@
         <p:spPr/>
         <p:txBody>
           <a:bodyPr/>
-          <a:lstStyle>
-            <a:extLst/>
-          </a:lstStyle>
+          <a:lstStyle/>
           <a:p>
             <a:pPr lvl="0" eaLnBrk="1" latinLnBrk="0" hangingPunct="1"/>
             <a:r>
-              <a:rPr lang="it-IT" smtClean="0"/>
+              <a:rPr lang="it-IT"/>
               <a:t>Fare clic per modificare stili del testo dello schema</a:t>
             </a:r>
           </a:p>
           <a:p>
             <a:pPr lvl="1" eaLnBrk="1" latinLnBrk="0" hangingPunct="1"/>
             <a:r>
-              <a:rPr lang="it-IT" smtClean="0"/>
+              <a:rPr lang="it-IT"/>
               <a:t>Secondo livello</a:t>
             </a:r>
           </a:p>
           <a:p>
             <a:pPr lvl="2" eaLnBrk="1" latinLnBrk="0" hangingPunct="1"/>
             <a:r>
-              <a:rPr lang="it-IT" smtClean="0"/>
+              <a:rPr lang="it-IT"/>
               <a:t>Terzo livello</a:t>
             </a:r>
           </a:p>
           <a:p>
             <a:pPr lvl="3" eaLnBrk="1" latinLnBrk="0" hangingPunct="1"/>
             <a:r>
-              <a:rPr lang="it-IT" smtClean="0"/>
+              <a:rPr lang="it-IT"/>
               <a:t>Quarto livello</a:t>
             </a:r>
           </a:p>
           <a:p>
             <a:pPr lvl="4" eaLnBrk="1" latinLnBrk="0" hangingPunct="1"/>
             <a:r>
-              <a:rPr lang="it-IT" smtClean="0"/>
+              <a:rPr lang="it-IT"/>
               <a:t>Quinto livello</a:t>
             </a:r>
             <a:endParaRPr kumimoji="0" lang="en-US"/>
@@ -1263,9 +1249,7 @@
         <p:spPr/>
         <p:txBody>
           <a:bodyPr/>
-          <a:lstStyle>
-            <a:extLst/>
-          </a:lstStyle>
+          <a:lstStyle/>
           <a:p>
             <a:fld id="{85911CFA-FE05-4CEE-ABBD-2C802EF4F6BC}" type="datetimeFigureOut">
               <a:rPr lang="it-IT" smtClean="0"/>
@@ -1288,9 +1272,7 @@
         <p:spPr/>
         <p:txBody>
           <a:bodyPr/>
-          <a:lstStyle>
-            <a:extLst/>
-          </a:lstStyle>
+          <a:lstStyle/>
           <a:p>
             <a:endParaRPr lang="it-IT"/>
           </a:p>
@@ -1309,9 +1291,7 @@
         <p:spPr/>
         <p:txBody>
           <a:bodyPr/>
-          <a:lstStyle>
-            <a:extLst/>
-          </a:lstStyle>
+          <a:lstStyle/>
           <a:p>
             <a:fld id="{A8037E01-E68B-4FCB-B645-70B9FE392D0B}" type="slidenum">
               <a:rPr lang="it-IT" smtClean="0"/>
@@ -1334,12 +1314,10 @@
         <p:spPr/>
         <p:txBody>
           <a:bodyPr rtlCol="0"/>
-          <a:lstStyle>
-            <a:extLst/>
-          </a:lstStyle>
+          <a:lstStyle/>
           <a:p>
             <a:r>
-              <a:rPr kumimoji="0" lang="it-IT" smtClean="0"/>
+              <a:rPr kumimoji="0" lang="it-IT"/>
               <a:t>Fare clic per modificare lo stile del titolo</a:t>
             </a:r>
             <a:endParaRPr kumimoji="0" lang="en-US"/>
@@ -1420,7 +1398,7 @@
           </a:lstStyle>
           <a:p>
             <a:r>
-              <a:rPr kumimoji="0" lang="it-IT" smtClean="0"/>
+              <a:rPr kumimoji="0" lang="it-IT"/>
               <a:t>Fare clic per modificare lo stile del titolo</a:t>
             </a:r>
             <a:endParaRPr kumimoji="0" lang="en-US"/>
@@ -1499,7 +1477,7 @@
           <a:p>
             <a:pPr lvl="0" eaLnBrk="1" latinLnBrk="0" hangingPunct="1"/>
             <a:r>
-              <a:rPr kumimoji="0" lang="it-IT" smtClean="0"/>
+              <a:rPr kumimoji="0" lang="it-IT"/>
               <a:t>Fare clic per modificare stili del testo dello schema</a:t>
             </a:r>
           </a:p>
@@ -1518,9 +1496,7 @@
         <p:spPr/>
         <p:txBody>
           <a:bodyPr/>
-          <a:lstStyle>
-            <a:extLst/>
-          </a:lstStyle>
+          <a:lstStyle/>
           <a:p>
             <a:fld id="{85911CFA-FE05-4CEE-ABBD-2C802EF4F6BC}" type="datetimeFigureOut">
               <a:rPr lang="it-IT" smtClean="0"/>
@@ -1543,9 +1519,7 @@
         <p:spPr/>
         <p:txBody>
           <a:bodyPr/>
-          <a:lstStyle>
-            <a:extLst/>
-          </a:lstStyle>
+          <a:lstStyle/>
           <a:p>
             <a:endParaRPr lang="it-IT"/>
           </a:p>
@@ -1564,9 +1538,7 @@
         <p:spPr/>
         <p:txBody>
           <a:bodyPr/>
-          <a:lstStyle>
-            <a:extLst/>
-          </a:lstStyle>
+          <a:lstStyle/>
           <a:p>
             <a:fld id="{A8037E01-E68B-4FCB-B645-70B9FE392D0B}" type="slidenum">
               <a:rPr lang="it-IT" smtClean="0"/>
@@ -1647,9 +1619,7 @@
         </p:style>
         <p:txBody>
           <a:bodyPr anchor="ctr"/>
-          <a:lstStyle>
-            <a:extLst/>
-          </a:lstStyle>
+          <a:lstStyle/>
           <a:p>
             <a:pPr algn="l" eaLnBrk="1" latinLnBrk="0" hangingPunct="1"/>
             <a:endParaRPr kumimoji="0" lang="en-US"/>
@@ -1727,9 +1697,7 @@
         </p:style>
         <p:txBody>
           <a:bodyPr anchor="ctr"/>
-          <a:lstStyle>
-            <a:extLst/>
-          </a:lstStyle>
+          <a:lstStyle/>
           <a:p>
             <a:pPr algn="l" eaLnBrk="1" latinLnBrk="0" hangingPunct="1"/>
             <a:endParaRPr kumimoji="0" lang="en-US"/>
@@ -1805,35 +1773,35 @@
           <a:p>
             <a:pPr lvl="0" eaLnBrk="1" latinLnBrk="0" hangingPunct="1"/>
             <a:r>
-              <a:rPr lang="it-IT" smtClean="0"/>
+              <a:rPr lang="it-IT"/>
               <a:t>Fare clic per modificare stili del testo dello schema</a:t>
             </a:r>
           </a:p>
           <a:p>
             <a:pPr lvl="1" eaLnBrk="1" latinLnBrk="0" hangingPunct="1"/>
             <a:r>
-              <a:rPr lang="it-IT" smtClean="0"/>
+              <a:rPr lang="it-IT"/>
               <a:t>Secondo livello</a:t>
             </a:r>
           </a:p>
           <a:p>
             <a:pPr lvl="2" eaLnBrk="1" latinLnBrk="0" hangingPunct="1"/>
             <a:r>
-              <a:rPr lang="it-IT" smtClean="0"/>
+              <a:rPr lang="it-IT"/>
               <a:t>Terzo livello</a:t>
             </a:r>
           </a:p>
           <a:p>
             <a:pPr lvl="3" eaLnBrk="1" latinLnBrk="0" hangingPunct="1"/>
             <a:r>
-              <a:rPr lang="it-IT" smtClean="0"/>
+              <a:rPr lang="it-IT"/>
               <a:t>Quarto livello</a:t>
             </a:r>
           </a:p>
           <a:p>
             <a:pPr lvl="4" eaLnBrk="1" latinLnBrk="0" hangingPunct="1"/>
             <a:r>
-              <a:rPr lang="it-IT" smtClean="0"/>
+              <a:rPr lang="it-IT"/>
               <a:t>Quinto livello</a:t>
             </a:r>
             <a:endParaRPr kumimoji="0" lang="en-US"/>
@@ -1879,35 +1847,35 @@
           <a:p>
             <a:pPr lvl="0" eaLnBrk="1" latinLnBrk="0" hangingPunct="1"/>
             <a:r>
-              <a:rPr lang="it-IT" smtClean="0"/>
+              <a:rPr lang="it-IT"/>
               <a:t>Fare clic per modificare stili del testo dello schema</a:t>
             </a:r>
           </a:p>
           <a:p>
             <a:pPr lvl="1" eaLnBrk="1" latinLnBrk="0" hangingPunct="1"/>
             <a:r>
-              <a:rPr lang="it-IT" smtClean="0"/>
+              <a:rPr lang="it-IT"/>
               <a:t>Secondo livello</a:t>
             </a:r>
           </a:p>
           <a:p>
             <a:pPr lvl="2" eaLnBrk="1" latinLnBrk="0" hangingPunct="1"/>
             <a:r>
-              <a:rPr lang="it-IT" smtClean="0"/>
+              <a:rPr lang="it-IT"/>
               <a:t>Terzo livello</a:t>
             </a:r>
           </a:p>
           <a:p>
             <a:pPr lvl="3" eaLnBrk="1" latinLnBrk="0" hangingPunct="1"/>
             <a:r>
-              <a:rPr lang="it-IT" smtClean="0"/>
+              <a:rPr lang="it-IT"/>
               <a:t>Quarto livello</a:t>
             </a:r>
           </a:p>
           <a:p>
             <a:pPr lvl="4" eaLnBrk="1" latinLnBrk="0" hangingPunct="1"/>
             <a:r>
-              <a:rPr lang="it-IT" smtClean="0"/>
+              <a:rPr lang="it-IT"/>
               <a:t>Quinto livello</a:t>
             </a:r>
             <a:endParaRPr kumimoji="0" lang="en-US"/>
@@ -1927,9 +1895,7 @@
         <p:spPr/>
         <p:txBody>
           <a:bodyPr/>
-          <a:lstStyle>
-            <a:extLst/>
-          </a:lstStyle>
+          <a:lstStyle/>
           <a:p>
             <a:fld id="{85911CFA-FE05-4CEE-ABBD-2C802EF4F6BC}" type="datetimeFigureOut">
               <a:rPr lang="it-IT" smtClean="0"/>
@@ -1952,9 +1918,7 @@
         <p:spPr/>
         <p:txBody>
           <a:bodyPr/>
-          <a:lstStyle>
-            <a:extLst/>
-          </a:lstStyle>
+          <a:lstStyle/>
           <a:p>
             <a:endParaRPr lang="it-IT"/>
           </a:p>
@@ -1973,9 +1937,7 @@
         <p:spPr/>
         <p:txBody>
           <a:bodyPr/>
-          <a:lstStyle>
-            <a:extLst/>
-          </a:lstStyle>
+          <a:lstStyle/>
           <a:p>
             <a:fld id="{A8037E01-E68B-4FCB-B645-70B9FE392D0B}" type="slidenum">
               <a:rPr lang="it-IT" smtClean="0"/>
@@ -1998,12 +1960,10 @@
         <p:spPr/>
         <p:txBody>
           <a:bodyPr rtlCol="0"/>
-          <a:lstStyle>
-            <a:extLst/>
-          </a:lstStyle>
+          <a:lstStyle/>
           <a:p>
             <a:r>
-              <a:rPr kumimoji="0" lang="it-IT" smtClean="0"/>
+              <a:rPr kumimoji="0" lang="it-IT"/>
               <a:t>Fare clic per modificare lo stile del titolo</a:t>
             </a:r>
             <a:endParaRPr kumimoji="0" lang="en-US"/>
@@ -2066,7 +2026,7 @@
           </a:lstStyle>
           <a:p>
             <a:r>
-              <a:rPr kumimoji="0" lang="it-IT" smtClean="0"/>
+              <a:rPr kumimoji="0" lang="it-IT"/>
               <a:t>Fare clic per modificare lo stile del titolo</a:t>
             </a:r>
             <a:endParaRPr kumimoji="0" lang="en-US"/>
@@ -2130,7 +2090,7 @@
           <a:p>
             <a:pPr lvl="0" eaLnBrk="1" latinLnBrk="0" hangingPunct="1"/>
             <a:r>
-              <a:rPr kumimoji="0" lang="it-IT" smtClean="0"/>
+              <a:rPr kumimoji="0" lang="it-IT"/>
               <a:t>Fare clic per modificare stili del testo dello schema</a:t>
             </a:r>
           </a:p>
@@ -2193,7 +2153,7 @@
           <a:p>
             <a:pPr lvl="0" eaLnBrk="1" latinLnBrk="0" hangingPunct="1"/>
             <a:r>
-              <a:rPr kumimoji="0" lang="it-IT" smtClean="0"/>
+              <a:rPr kumimoji="0" lang="it-IT"/>
               <a:t>Fare clic per modificare stili del testo dello schema</a:t>
             </a:r>
           </a:p>
@@ -2243,35 +2203,35 @@
           <a:p>
             <a:pPr lvl="0" eaLnBrk="1" latinLnBrk="0" hangingPunct="1"/>
             <a:r>
-              <a:rPr lang="it-IT" smtClean="0"/>
+              <a:rPr lang="it-IT"/>
               <a:t>Fare clic per modificare stili del testo dello schema</a:t>
             </a:r>
           </a:p>
           <a:p>
             <a:pPr lvl="1" eaLnBrk="1" latinLnBrk="0" hangingPunct="1"/>
             <a:r>
-              <a:rPr lang="it-IT" smtClean="0"/>
+              <a:rPr lang="it-IT"/>
               <a:t>Secondo livello</a:t>
             </a:r>
           </a:p>
           <a:p>
             <a:pPr lvl="2" eaLnBrk="1" latinLnBrk="0" hangingPunct="1"/>
             <a:r>
-              <a:rPr lang="it-IT" smtClean="0"/>
+              <a:rPr lang="it-IT"/>
               <a:t>Terzo livello</a:t>
             </a:r>
           </a:p>
           <a:p>
             <a:pPr lvl="3" eaLnBrk="1" latinLnBrk="0" hangingPunct="1"/>
             <a:r>
-              <a:rPr lang="it-IT" smtClean="0"/>
+              <a:rPr lang="it-IT"/>
               <a:t>Quarto livello</a:t>
             </a:r>
           </a:p>
           <a:p>
             <a:pPr lvl="4" eaLnBrk="1" latinLnBrk="0" hangingPunct="1"/>
             <a:r>
-              <a:rPr lang="it-IT" smtClean="0"/>
+              <a:rPr lang="it-IT"/>
               <a:t>Quinto livello</a:t>
             </a:r>
             <a:endParaRPr kumimoji="0" lang="en-US"/>
@@ -2325,35 +2285,35 @@
           <a:p>
             <a:pPr lvl="0" eaLnBrk="1" latinLnBrk="0" hangingPunct="1"/>
             <a:r>
-              <a:rPr lang="it-IT" smtClean="0"/>
+              <a:rPr lang="it-IT"/>
               <a:t>Fare clic per modificare stili del testo dello schema</a:t>
             </a:r>
           </a:p>
           <a:p>
             <a:pPr lvl="1" eaLnBrk="1" latinLnBrk="0" hangingPunct="1"/>
             <a:r>
-              <a:rPr lang="it-IT" smtClean="0"/>
+              <a:rPr lang="it-IT"/>
               <a:t>Secondo livello</a:t>
             </a:r>
           </a:p>
           <a:p>
             <a:pPr lvl="2" eaLnBrk="1" latinLnBrk="0" hangingPunct="1"/>
             <a:r>
-              <a:rPr lang="it-IT" smtClean="0"/>
+              <a:rPr lang="it-IT"/>
               <a:t>Terzo livello</a:t>
             </a:r>
           </a:p>
           <a:p>
             <a:pPr lvl="3" eaLnBrk="1" latinLnBrk="0" hangingPunct="1"/>
             <a:r>
-              <a:rPr lang="it-IT" smtClean="0"/>
+              <a:rPr lang="it-IT"/>
               <a:t>Quarto livello</a:t>
             </a:r>
           </a:p>
           <a:p>
             <a:pPr lvl="4" eaLnBrk="1" latinLnBrk="0" hangingPunct="1"/>
             <a:r>
-              <a:rPr lang="it-IT" smtClean="0"/>
+              <a:rPr lang="it-IT"/>
               <a:t>Quinto livello</a:t>
             </a:r>
             <a:endParaRPr kumimoji="0" lang="en-US"/>
@@ -2373,9 +2333,7 @@
         <p:spPr/>
         <p:txBody>
           <a:bodyPr/>
-          <a:lstStyle>
-            <a:extLst/>
-          </a:lstStyle>
+          <a:lstStyle/>
           <a:p>
             <a:fld id="{85911CFA-FE05-4CEE-ABBD-2C802EF4F6BC}" type="datetimeFigureOut">
               <a:rPr lang="it-IT" smtClean="0"/>
@@ -2398,9 +2356,7 @@
         <p:spPr/>
         <p:txBody>
           <a:bodyPr/>
-          <a:lstStyle>
-            <a:extLst/>
-          </a:lstStyle>
+          <a:lstStyle/>
           <a:p>
             <a:endParaRPr lang="it-IT"/>
           </a:p>
@@ -2419,9 +2375,7 @@
         <p:spPr/>
         <p:txBody>
           <a:bodyPr/>
-          <a:lstStyle>
-            <a:extLst/>
-          </a:lstStyle>
+          <a:lstStyle/>
           <a:p>
             <a:fld id="{A8037E01-E68B-4FCB-B645-70B9FE392D0B}" type="slidenum">
               <a:rPr lang="it-IT" smtClean="0"/>
@@ -2474,9 +2428,7 @@
         <p:spPr/>
         <p:txBody>
           <a:bodyPr/>
-          <a:lstStyle>
-            <a:extLst/>
-          </a:lstStyle>
+          <a:lstStyle/>
           <a:p>
             <a:fld id="{85911CFA-FE05-4CEE-ABBD-2C802EF4F6BC}" type="datetimeFigureOut">
               <a:rPr lang="it-IT" smtClean="0"/>
@@ -2499,9 +2451,7 @@
         <p:spPr/>
         <p:txBody>
           <a:bodyPr/>
-          <a:lstStyle>
-            <a:extLst/>
-          </a:lstStyle>
+          <a:lstStyle/>
           <a:p>
             <a:endParaRPr lang="it-IT"/>
           </a:p>
@@ -2520,9 +2470,7 @@
         <p:spPr/>
         <p:txBody>
           <a:bodyPr/>
-          <a:lstStyle>
-            <a:extLst/>
-          </a:lstStyle>
+          <a:lstStyle/>
           <a:p>
             <a:fld id="{A8037E01-E68B-4FCB-B645-70B9FE392D0B}" type="slidenum">
               <a:rPr lang="it-IT" smtClean="0"/>
@@ -2545,12 +2493,10 @@
         <p:spPr/>
         <p:txBody>
           <a:bodyPr rtlCol="0"/>
-          <a:lstStyle>
-            <a:extLst/>
-          </a:lstStyle>
+          <a:lstStyle/>
           <a:p>
             <a:r>
-              <a:rPr kumimoji="0" lang="it-IT" smtClean="0"/>
+              <a:rPr kumimoji="0" lang="it-IT"/>
               <a:t>Fare clic per modificare lo stile del titolo</a:t>
             </a:r>
             <a:endParaRPr kumimoji="0" lang="en-US"/>
@@ -2595,9 +2541,7 @@
         <p:spPr/>
         <p:txBody>
           <a:bodyPr/>
-          <a:lstStyle>
-            <a:extLst/>
-          </a:lstStyle>
+          <a:lstStyle/>
           <a:p>
             <a:fld id="{85911CFA-FE05-4CEE-ABBD-2C802EF4F6BC}" type="datetimeFigureOut">
               <a:rPr lang="it-IT" smtClean="0"/>
@@ -2620,9 +2564,7 @@
         <p:spPr/>
         <p:txBody>
           <a:bodyPr/>
-          <a:lstStyle>
-            <a:extLst/>
-          </a:lstStyle>
+          <a:lstStyle/>
           <a:p>
             <a:endParaRPr lang="it-IT"/>
           </a:p>
@@ -2641,9 +2583,7 @@
         <p:spPr/>
         <p:txBody>
           <a:bodyPr/>
-          <a:lstStyle>
-            <a:extLst/>
-          </a:lstStyle>
+          <a:lstStyle/>
           <a:p>
             <a:fld id="{A8037E01-E68B-4FCB-B645-70B9FE392D0B}" type="slidenum">
               <a:rPr lang="it-IT" smtClean="0"/>
@@ -2720,7 +2660,7 @@
           </a:lstStyle>
           <a:p>
             <a:r>
-              <a:rPr kumimoji="0" lang="it-IT" smtClean="0"/>
+              <a:rPr kumimoji="0" lang="it-IT"/>
               <a:t>Fare clic per modificare lo stile del titolo</a:t>
             </a:r>
             <a:endParaRPr kumimoji="0" lang="en-US"/>
@@ -2771,7 +2711,7 @@
           <a:p>
             <a:pPr lvl="0" eaLnBrk="1" latinLnBrk="0" hangingPunct="1"/>
             <a:r>
-              <a:rPr kumimoji="0" lang="it-IT" smtClean="0"/>
+              <a:rPr kumimoji="0" lang="it-IT"/>
               <a:t>Fare clic per modificare stili del testo dello schema</a:t>
             </a:r>
           </a:p>
@@ -2816,35 +2756,35 @@
           <a:p>
             <a:pPr lvl="0" eaLnBrk="1" latinLnBrk="0" hangingPunct="1"/>
             <a:r>
-              <a:rPr lang="it-IT" smtClean="0"/>
+              <a:rPr lang="it-IT"/>
               <a:t>Fare clic per modificare stili del testo dello schema</a:t>
             </a:r>
           </a:p>
           <a:p>
             <a:pPr lvl="1" eaLnBrk="1" latinLnBrk="0" hangingPunct="1"/>
             <a:r>
-              <a:rPr lang="it-IT" smtClean="0"/>
+              <a:rPr lang="it-IT"/>
               <a:t>Secondo livello</a:t>
             </a:r>
           </a:p>
           <a:p>
             <a:pPr lvl="2" eaLnBrk="1" latinLnBrk="0" hangingPunct="1"/>
             <a:r>
-              <a:rPr lang="it-IT" smtClean="0"/>
+              <a:rPr lang="it-IT"/>
               <a:t>Terzo livello</a:t>
             </a:r>
           </a:p>
           <a:p>
             <a:pPr lvl="3" eaLnBrk="1" latinLnBrk="0" hangingPunct="1"/>
             <a:r>
-              <a:rPr lang="it-IT" smtClean="0"/>
+              <a:rPr lang="it-IT"/>
               <a:t>Quarto livello</a:t>
             </a:r>
           </a:p>
           <a:p>
             <a:pPr lvl="4" eaLnBrk="1" latinLnBrk="0" hangingPunct="1"/>
             <a:r>
-              <a:rPr lang="it-IT" smtClean="0"/>
+              <a:rPr lang="it-IT"/>
               <a:t>Quinto livello</a:t>
             </a:r>
             <a:endParaRPr kumimoji="0" lang="en-US"/>
@@ -2869,9 +2809,7 @@
         </p:spPr>
         <p:txBody>
           <a:bodyPr/>
-          <a:lstStyle>
-            <a:extLst/>
-          </a:lstStyle>
+          <a:lstStyle/>
           <a:p>
             <a:fld id="{85911CFA-FE05-4CEE-ABBD-2C802EF4F6BC}" type="datetimeFigureOut">
               <a:rPr lang="it-IT" smtClean="0"/>
@@ -2894,9 +2832,7 @@
         <p:spPr/>
         <p:txBody>
           <a:bodyPr/>
-          <a:lstStyle>
-            <a:extLst/>
-          </a:lstStyle>
+          <a:lstStyle/>
           <a:p>
             <a:endParaRPr lang="it-IT"/>
           </a:p>
@@ -2915,9 +2851,7 @@
         <p:spPr/>
         <p:txBody>
           <a:bodyPr/>
-          <a:lstStyle>
-            <a:extLst/>
-          </a:lstStyle>
+          <a:lstStyle/>
           <a:p>
             <a:fld id="{A8037E01-E68B-4FCB-B645-70B9FE392D0B}" type="slidenum">
               <a:rPr lang="it-IT" smtClean="0"/>
@@ -2998,7 +2932,7 @@
           <a:p>
             <a:pPr lvl="0" eaLnBrk="1" latinLnBrk="0" hangingPunct="1"/>
             <a:r>
-              <a:rPr kumimoji="0" lang="it-IT" smtClean="0"/>
+              <a:rPr kumimoji="0" lang="it-IT"/>
               <a:t>Fare clic per modificare stili del testo dello schema</a:t>
             </a:r>
           </a:p>
@@ -3047,7 +2981,7 @@
           </a:lstStyle>
           <a:p>
             <a:r>
-              <a:rPr kumimoji="0" lang="it-IT" smtClean="0"/>
+              <a:rPr kumimoji="0" lang="it-IT"/>
               <a:t>Fare clic sull'icona per inserire un'immagine</a:t>
             </a:r>
             <a:endParaRPr kumimoji="0" lang="en-US" dirty="0"/>
@@ -3192,7 +3126,7 @@
           </a:lstStyle>
           <a:p>
             <a:r>
-              <a:rPr kumimoji="0" lang="it-IT" smtClean="0"/>
+              <a:rPr kumimoji="0" lang="it-IT"/>
               <a:t>Fare clic per modificare lo stile del titolo</a:t>
             </a:r>
             <a:endParaRPr kumimoji="0" lang="en-US"/>
@@ -3275,9 +3209,7 @@
         </p:spPr>
         <p:txBody>
           <a:bodyPr vert="horz" wrap="square" lIns="91440" tIns="45720" rIns="91440" bIns="45720" anchor="t" compatLnSpc="1"/>
-          <a:lstStyle>
-            <a:extLst/>
-          </a:lstStyle>
+          <a:lstStyle/>
           <a:p>
             <a:endParaRPr kumimoji="0" lang="en-US"/>
           </a:p>
@@ -3357,9 +3289,7 @@
         </p:spPr>
         <p:txBody>
           <a:bodyPr vert="horz" wrap="square" lIns="91440" tIns="45720" rIns="91440" bIns="45720" anchor="t" compatLnSpc="1"/>
-          <a:lstStyle>
-            <a:extLst/>
-          </a:lstStyle>
+          <a:lstStyle/>
           <a:p>
             <a:endParaRPr kumimoji="0" lang="en-US"/>
           </a:p>
@@ -3467,9 +3397,7 @@
         </p:style>
         <p:txBody>
           <a:bodyPr vert="horz" wrap="square" lIns="91440" tIns="45720" rIns="91440" bIns="45720" anchor="ctr" compatLnSpc="1"/>
-          <a:lstStyle>
-            <a:extLst/>
-          </a:lstStyle>
+          <a:lstStyle/>
           <a:p>
             <a:pPr algn="ctr" eaLnBrk="1" latinLnBrk="0" hangingPunct="1"/>
             <a:endParaRPr kumimoji="0" lang="en-US"/>
@@ -3600,9 +3528,7 @@
         </p:style>
         <p:txBody>
           <a:bodyPr anchor="ctr"/>
-          <a:lstStyle>
-            <a:extLst/>
-          </a:lstStyle>
+          <a:lstStyle/>
           <a:p>
             <a:pPr algn="l" eaLnBrk="1" latinLnBrk="0" hangingPunct="1"/>
             <a:endParaRPr kumimoji="0" lang="en-US"/>
@@ -3680,9 +3606,7 @@
         </p:style>
         <p:txBody>
           <a:bodyPr anchor="ctr"/>
-          <a:lstStyle>
-            <a:extLst/>
-          </a:lstStyle>
+          <a:lstStyle/>
           <a:p>
             <a:pPr algn="l" eaLnBrk="1" latinLnBrk="0" hangingPunct="1"/>
             <a:endParaRPr kumimoji="0" lang="en-US"/>
@@ -3795,9 +3719,7 @@
         </p:spPr>
         <p:txBody>
           <a:bodyPr vert="horz" wrap="square" lIns="91440" tIns="45720" rIns="91440" bIns="45720" anchor="t" compatLnSpc="1"/>
-          <a:lstStyle>
-            <a:extLst/>
-          </a:lstStyle>
+          <a:lstStyle/>
           <a:p>
             <a:endParaRPr kumimoji="0" lang="en-US"/>
           </a:p>
@@ -3877,9 +3799,7 @@
         </p:spPr>
         <p:txBody>
           <a:bodyPr vert="horz" wrap="square" lIns="91440" tIns="45720" rIns="91440" bIns="45720" anchor="t" compatLnSpc="1"/>
-          <a:lstStyle>
-            <a:extLst/>
-          </a:lstStyle>
+          <a:lstStyle/>
           <a:p>
             <a:endParaRPr kumimoji="0" lang="en-US"/>
           </a:p>
@@ -3987,9 +3907,7 @@
         </p:style>
         <p:txBody>
           <a:bodyPr vert="horz" wrap="square" lIns="91440" tIns="45720" rIns="91440" bIns="45720" anchor="ctr" compatLnSpc="1"/>
-          <a:lstStyle>
-            <a:extLst/>
-          </a:lstStyle>
+          <a:lstStyle/>
           <a:p>
             <a:pPr algn="ctr" eaLnBrk="1" latinLnBrk="0" hangingPunct="1"/>
             <a:endParaRPr kumimoji="0" lang="en-US"/>
@@ -4079,12 +3997,10 @@
               <a:bevelT w="25400" h="25400"/>
             </a:sp3d>
           </a:bodyPr>
-          <a:lstStyle>
-            <a:extLst/>
-          </a:lstStyle>
+          <a:lstStyle/>
           <a:p>
             <a:r>
-              <a:rPr kumimoji="0" lang="it-IT" smtClean="0"/>
+              <a:rPr kumimoji="0" lang="it-IT"/>
               <a:t>Fare clic per modificare lo stile del titolo</a:t>
             </a:r>
             <a:endParaRPr kumimoji="0" lang="en-US"/>
@@ -4114,41 +4030,39 @@
           <a:bodyPr vert="horz">
             <a:normAutofit/>
           </a:bodyPr>
-          <a:lstStyle>
-            <a:extLst/>
-          </a:lstStyle>
+          <a:lstStyle/>
           <a:p>
             <a:pPr lvl="0" eaLnBrk="1" latinLnBrk="0" hangingPunct="1"/>
             <a:r>
-              <a:rPr kumimoji="0" lang="it-IT" smtClean="0"/>
+              <a:rPr kumimoji="0" lang="it-IT"/>
               <a:t>Fare clic per modificare stili del testo dello schema</a:t>
             </a:r>
           </a:p>
           <a:p>
             <a:pPr lvl="1" eaLnBrk="1" latinLnBrk="0" hangingPunct="1"/>
             <a:r>
-              <a:rPr kumimoji="0" lang="it-IT" smtClean="0"/>
+              <a:rPr kumimoji="0" lang="it-IT"/>
               <a:t>Secondo livello</a:t>
             </a:r>
           </a:p>
           <a:p>
             <a:pPr lvl="2" eaLnBrk="1" latinLnBrk="0" hangingPunct="1"/>
             <a:r>
-              <a:rPr kumimoji="0" lang="it-IT" smtClean="0"/>
+              <a:rPr kumimoji="0" lang="it-IT"/>
               <a:t>Terzo livello</a:t>
             </a:r>
           </a:p>
           <a:p>
             <a:pPr lvl="3" eaLnBrk="1" latinLnBrk="0" hangingPunct="1"/>
             <a:r>
-              <a:rPr kumimoji="0" lang="it-IT" smtClean="0"/>
+              <a:rPr kumimoji="0" lang="it-IT"/>
               <a:t>Quarto livello</a:t>
             </a:r>
           </a:p>
           <a:p>
             <a:pPr lvl="4" eaLnBrk="1" latinLnBrk="0" hangingPunct="1"/>
             <a:r>
-              <a:rPr kumimoji="0" lang="it-IT" smtClean="0"/>
+              <a:rPr kumimoji="0" lang="it-IT"/>
               <a:t>Quinto livello</a:t>
             </a:r>
             <a:endParaRPr kumimoji="0" lang="en-US"/>
@@ -4619,7 +4533,7 @@
           <a:lstStyle/>
           <a:p>
             <a:r>
-              <a:rPr lang="it-IT" dirty="0" smtClean="0">
+              <a:rPr lang="it-IT" dirty="0">
                 <a:solidFill>
                   <a:schemeClr val="bg2">
                     <a:lumMod val="50000"/>
@@ -4629,7 +4543,7 @@
               <a:t>FRIGO </a:t>
             </a:r>
             <a:br>
-              <a:rPr lang="it-IT" dirty="0" smtClean="0">
+              <a:rPr lang="it-IT" dirty="0">
                 <a:solidFill>
                   <a:schemeClr val="bg2">
                     <a:lumMod val="50000"/>
@@ -4638,7 +4552,7 @@
               </a:rPr>
             </a:br>
             <a:r>
-              <a:rPr lang="it-IT" dirty="0" smtClean="0">
+              <a:rPr lang="it-IT" dirty="0">
                 <a:solidFill>
                   <a:schemeClr val="bg2">
                     <a:lumMod val="50000"/>
@@ -4648,7 +4562,7 @@
               <a:t>AUTOMATICO</a:t>
             </a:r>
             <a:br>
-              <a:rPr lang="it-IT" dirty="0" smtClean="0">
+              <a:rPr lang="it-IT" dirty="0">
                 <a:solidFill>
                   <a:schemeClr val="bg2">
                     <a:lumMod val="50000"/>
@@ -4689,20 +4603,19 @@
           <a:lstStyle/>
           <a:p>
             <a:r>
-              <a:rPr lang="it-IT" sz="2800" dirty="0" err="1" smtClean="0"/>
+              <a:rPr lang="it-IT" sz="2800" dirty="0" err="1"/>
               <a:t>Pellizzer</a:t>
             </a:r>
             <a:r>
-              <a:rPr lang="it-IT" sz="2800" dirty="0" smtClean="0"/>
+              <a:rPr lang="it-IT" sz="2800" dirty="0"/>
               <a:t> Luca 5° Informatica </a:t>
             </a:r>
           </a:p>
           <a:p>
             <a:r>
-              <a:rPr lang="it-IT" sz="2800" dirty="0" smtClean="0"/>
+              <a:rPr lang="it-IT" sz="2800" dirty="0"/>
               <a:t>Progetto Maturità anno 2015/2016</a:t>
             </a:r>
-            <a:endParaRPr lang="it-IT" sz="2800" dirty="0"/>
           </a:p>
         </p:txBody>
       </p:sp>
@@ -5145,7 +5058,7 @@
           <a:p>
             <a:pPr algn="l"/>
             <a:r>
-              <a:rPr lang="it-IT" dirty="0" smtClean="0">
+              <a:rPr lang="it-IT" dirty="0">
                 <a:solidFill>
                   <a:schemeClr val="bg2">
                     <a:lumMod val="50000"/>
@@ -5154,13 +5067,6 @@
               </a:rPr>
               <a:t>I MIEI COMPITI E RUOLI</a:t>
             </a:r>
-            <a:endParaRPr lang="it-IT" dirty="0">
-              <a:solidFill>
-                <a:schemeClr val="bg2">
-                  <a:lumMod val="50000"/>
-                </a:schemeClr>
-              </a:solidFill>
-            </a:endParaRPr>
           </a:p>
         </p:txBody>
       </p:sp>
@@ -5188,7 +5094,7 @@
           <a:p>
             <a:pPr algn="l"/>
             <a:r>
-              <a:rPr lang="it-IT" dirty="0" smtClean="0"/>
+              <a:rPr lang="it-IT" dirty="0"/>
               <a:t>RUOLO ALL’INTERNO DEL GRUPPO: </a:t>
             </a:r>
           </a:p>
@@ -5196,59 +5102,51 @@
             <a:pPr algn="l"/>
             <a:r>
               <a:rPr lang="it-IT" dirty="0"/>
-              <a:t>	</a:t>
-            </a:r>
-            <a:r>
-              <a:rPr lang="it-IT" dirty="0" smtClean="0"/>
-              <a:t>-vice-capo</a:t>
+              <a:t>	-vice-capo</a:t>
             </a:r>
           </a:p>
           <a:p>
             <a:pPr algn="l"/>
             <a:r>
               <a:rPr lang="it-IT" dirty="0"/>
-              <a:t>	</a:t>
+              <a:t>	-programmatore SW</a:t>
             </a:r>
-            <a:r>
-              <a:rPr lang="it-IT" dirty="0" smtClean="0"/>
-              <a:t>-programmatore SW</a:t>
-            </a:r>
           </a:p>
           <a:p>
             <a:pPr algn="l"/>
-            <a:endParaRPr lang="it-IT" dirty="0" smtClean="0"/>
+            <a:endParaRPr lang="it-IT" dirty="0"/>
           </a:p>
           <a:p>
             <a:pPr algn="l"/>
             <a:r>
-              <a:rPr lang="it-IT" dirty="0" smtClean="0"/>
+              <a:rPr lang="it-IT" dirty="0"/>
               <a:t>COMPITI: </a:t>
             </a:r>
           </a:p>
           <a:p>
             <a:pPr algn="l"/>
             <a:r>
-              <a:rPr lang="it-IT" dirty="0" smtClean="0"/>
+              <a:rPr lang="it-IT" dirty="0"/>
               <a:t>	-Sviluppo interfaccia grafica software </a:t>
             </a:r>
           </a:p>
           <a:p>
             <a:pPr algn="l"/>
             <a:r>
-              <a:rPr lang="it-IT" dirty="0" smtClean="0"/>
+              <a:rPr lang="it-IT" dirty="0"/>
               <a:t>	-Sviluppo classe «Inventario» software </a:t>
             </a:r>
           </a:p>
           <a:p>
             <a:pPr algn="l"/>
             <a:r>
-              <a:rPr lang="it-IT" dirty="0" smtClean="0"/>
+              <a:rPr lang="it-IT" dirty="0"/>
               <a:t>	-Sviluppo classe «Registrazione Frigo» software </a:t>
             </a:r>
           </a:p>
           <a:p>
             <a:pPr algn="l"/>
-            <a:endParaRPr lang="it-IT" dirty="0" smtClean="0"/>
+            <a:endParaRPr lang="it-IT" dirty="0"/>
           </a:p>
         </p:txBody>
       </p:sp>
@@ -6130,7 +6028,7 @@
           <a:lstStyle/>
           <a:p>
             <a:r>
-              <a:rPr lang="it-IT" dirty="0" smtClean="0">
+              <a:rPr lang="it-IT" dirty="0">
                 <a:solidFill>
                   <a:schemeClr val="bg2">
                     <a:lumMod val="50000"/>
@@ -6139,13 +6037,6 @@
               </a:rPr>
               <a:t>INTERFACCIA GRAFICA</a:t>
             </a:r>
-            <a:endParaRPr lang="it-IT" dirty="0">
-              <a:solidFill>
-                <a:schemeClr val="bg2">
-                  <a:lumMod val="50000"/>
-                </a:schemeClr>
-              </a:solidFill>
-            </a:endParaRPr>
           </a:p>
         </p:txBody>
       </p:sp>
@@ -6432,7 +6323,7 @@
           <a:lstStyle/>
           <a:p>
             <a:r>
-              <a:rPr lang="it-IT" dirty="0" smtClean="0">
+              <a:rPr lang="it-IT" dirty="0">
                 <a:solidFill>
                   <a:schemeClr val="bg2">
                     <a:lumMod val="50000"/>
@@ -6441,13 +6332,6 @@
               </a:rPr>
               <a:t>INVENTARIO</a:t>
             </a:r>
-            <a:endParaRPr lang="it-IT" dirty="0">
-              <a:solidFill>
-                <a:schemeClr val="bg2">
-                  <a:lumMod val="50000"/>
-                </a:schemeClr>
-              </a:solidFill>
-            </a:endParaRPr>
           </a:p>
         </p:txBody>
       </p:sp>
@@ -6544,16 +6428,15 @@
           <a:lstStyle/>
           <a:p>
             <a:r>
-              <a:rPr lang="it-IT" dirty="0" smtClean="0"/>
+              <a:rPr lang="it-IT" dirty="0"/>
               <a:t>Interrogazione del DB per ricevere </a:t>
             </a:r>
           </a:p>
           <a:p>
             <a:r>
-              <a:rPr lang="it-IT" dirty="0" smtClean="0"/>
+              <a:rPr lang="it-IT" dirty="0"/>
               <a:t>il prodotto e le sue caratteristiche</a:t>
             </a:r>
-            <a:endParaRPr lang="it-IT" dirty="0"/>
           </a:p>
         </p:txBody>
       </p:sp>
@@ -6620,16 +6503,15 @@
           <a:lstStyle/>
           <a:p>
             <a:r>
-              <a:rPr lang="it-IT" dirty="0" smtClean="0"/>
+              <a:rPr lang="it-IT" dirty="0"/>
               <a:t>Tabulazione </a:t>
             </a:r>
           </a:p>
           <a:p>
             <a:r>
-              <a:rPr lang="it-IT" dirty="0" smtClean="0"/>
+              <a:rPr lang="it-IT" dirty="0"/>
               <a:t>delle informazioni</a:t>
             </a:r>
-            <a:endParaRPr lang="it-IT" dirty="0"/>
           </a:p>
         </p:txBody>
       </p:sp>
@@ -7473,7 +7355,7 @@
           <a:lstStyle/>
           <a:p>
             <a:r>
-              <a:rPr lang="it-IT" dirty="0" smtClean="0">
+              <a:rPr lang="it-IT" dirty="0">
                 <a:solidFill>
                   <a:schemeClr val="bg2">
                     <a:lumMod val="50000"/>
@@ -7482,13 +7364,6 @@
               </a:rPr>
               <a:t>INVENTARIO</a:t>
             </a:r>
-            <a:endParaRPr lang="it-IT" dirty="0">
-              <a:solidFill>
-                <a:schemeClr val="bg2">
-                  <a:lumMod val="50000"/>
-                </a:schemeClr>
-              </a:solidFill>
-            </a:endParaRPr>
           </a:p>
         </p:txBody>
       </p:sp>
@@ -7635,10 +7510,9 @@
           <a:lstStyle/>
           <a:p>
             <a:r>
-              <a:rPr lang="it-IT" dirty="0" smtClean="0"/>
+              <a:rPr lang="it-IT" dirty="0"/>
               <a:t>NOME PRODOTTO</a:t>
             </a:r>
-            <a:endParaRPr lang="it-IT" dirty="0"/>
           </a:p>
         </p:txBody>
       </p:sp>
@@ -7665,10 +7539,9 @@
           <a:lstStyle/>
           <a:p>
             <a:r>
-              <a:rPr lang="it-IT" dirty="0" smtClean="0"/>
+              <a:rPr lang="it-IT" dirty="0"/>
               <a:t>DATA SCADENZA</a:t>
             </a:r>
-            <a:endParaRPr lang="it-IT" dirty="0"/>
           </a:p>
         </p:txBody>
       </p:sp>
@@ -7695,10 +7568,9 @@
           <a:lstStyle/>
           <a:p>
             <a:r>
-              <a:rPr lang="it-IT" dirty="0" smtClean="0"/>
+              <a:rPr lang="it-IT" dirty="0"/>
               <a:t>BARCODE PRODOTTO</a:t>
             </a:r>
-            <a:endParaRPr lang="it-IT" dirty="0"/>
           </a:p>
         </p:txBody>
       </p:sp>
@@ -8435,7 +8307,7 @@
           <a:lstStyle/>
           <a:p>
             <a:r>
-              <a:rPr lang="it-IT" dirty="0" smtClean="0">
+              <a:rPr lang="it-IT" dirty="0">
                 <a:solidFill>
                   <a:schemeClr val="bg2">
                     <a:lumMod val="50000"/>
@@ -8444,13 +8316,6 @@
               </a:rPr>
               <a:t>REGISTRAZIONE FRIGO</a:t>
             </a:r>
-            <a:endParaRPr lang="it-IT" dirty="0">
-              <a:solidFill>
-                <a:schemeClr val="bg2">
-                  <a:lumMod val="50000"/>
-                </a:schemeClr>
-              </a:solidFill>
-            </a:endParaRPr>
           </a:p>
         </p:txBody>
       </p:sp>
@@ -8702,7 +8567,7 @@
           <a:lstStyle/>
           <a:p>
             <a:r>
-              <a:rPr lang="it-IT" dirty="0" smtClean="0">
+              <a:rPr lang="it-IT" dirty="0">
                 <a:solidFill>
                   <a:schemeClr val="bg2">
                     <a:lumMod val="50000"/>
@@ -8711,13 +8576,6 @@
               </a:rPr>
               <a:t>REGISTRAZIONE FRIGO</a:t>
             </a:r>
-            <a:endParaRPr lang="it-IT" dirty="0">
-              <a:solidFill>
-                <a:schemeClr val="bg2">
-                  <a:lumMod val="50000"/>
-                </a:schemeClr>
-              </a:solidFill>
-            </a:endParaRPr>
           </a:p>
         </p:txBody>
       </p:sp>
@@ -8894,22 +8752,21 @@
           <a:lstStyle/>
           <a:p>
             <a:r>
-              <a:rPr lang="it-IT" dirty="0" smtClean="0"/>
+              <a:rPr lang="it-IT" dirty="0"/>
               <a:t>Codice di</a:t>
             </a:r>
           </a:p>
           <a:p>
             <a:r>
-              <a:rPr lang="it-IT" dirty="0" smtClean="0"/>
+              <a:rPr lang="it-IT" dirty="0"/>
               <a:t>Inserimento </a:t>
             </a:r>
           </a:p>
           <a:p>
             <a:r>
-              <a:rPr lang="it-IT" dirty="0" smtClean="0"/>
+              <a:rPr lang="it-IT" dirty="0"/>
               <a:t>nel DB</a:t>
             </a:r>
-            <a:endParaRPr lang="it-IT" dirty="0"/>
           </a:p>
         </p:txBody>
       </p:sp>
@@ -8936,10 +8793,9 @@
           <a:lstStyle/>
           <a:p>
             <a:r>
-              <a:rPr lang="it-IT" dirty="0" smtClean="0"/>
+              <a:rPr lang="it-IT" dirty="0"/>
               <a:t>Controlli vari</a:t>
             </a:r>
-            <a:endParaRPr lang="it-IT" dirty="0"/>
           </a:p>
         </p:txBody>
       </p:sp>
@@ -9006,10 +8862,9 @@
           <a:lstStyle/>
           <a:p>
             <a:r>
-              <a:rPr lang="it-IT" dirty="0" smtClean="0"/>
+              <a:rPr lang="it-IT" dirty="0"/>
               <a:t>Controllo e criptazione password</a:t>
             </a:r>
-            <a:endParaRPr lang="it-IT" dirty="0"/>
           </a:p>
         </p:txBody>
       </p:sp>

</xml_diff>